<commit_message>
Update Classification on fashion-MNIST database using VGGnet-like architecture.pptx
</commit_message>
<xml_diff>
--- a/Classification on fashion-MNIST database using VGGnet-like architecture.pptx
+++ b/Classification on fashion-MNIST database using VGGnet-like architecture.pptx
@@ -6205,6 +6205,13 @@
   <p:clrMapOvr>
     <a:masterClrMapping/>
   </p:clrMapOvr>
+  <p:timing>
+    <p:tnLst>
+      <p:par>
+        <p:cTn id="1" dur="indefinite" restart="never" nodeType="tmRoot"/>
+      </p:par>
+    </p:tnLst>
+  </p:timing>
 </p:sld>
 </file>
 
@@ -6354,7 +6361,7 @@
         <p:spPr>
           <a:xfrm>
             <a:off x="5376325" y="860775"/>
-            <a:ext cx="3696000" cy="2662800"/>
+            <a:ext cx="3696000" cy="3370123"/>
           </a:xfrm>
           <a:prstGeom prst="rect">
             <a:avLst/>
@@ -6383,10 +6390,9 @@
               <a:buNone/>
             </a:pPr>
             <a:r>
-              <a:rPr lang="hu" sz="2300"/>
-              <a:t>28x28 grayscale images</a:t>
+              <a:rPr lang="hu" sz="2300" dirty="0" smtClean="0"/>
+              <a:t>Available in PyTorch</a:t>
             </a:r>
-            <a:endParaRPr sz="2300"/>
           </a:p>
           <a:p>
             <a:pPr marL="0" lvl="0" indent="0" algn="l" rtl="0">
@@ -6402,10 +6408,14 @@
               <a:buNone/>
             </a:pPr>
             <a:r>
-              <a:rPr lang="hu" sz="2300"/>
-              <a:t>10 classes</a:t>
+              <a:rPr lang="hu" sz="2300" dirty="0" smtClean="0"/>
+              <a:t>28x28 </a:t>
             </a:r>
-            <a:endParaRPr sz="2300"/>
+            <a:r>
+              <a:rPr lang="hu" sz="2300" dirty="0"/>
+              <a:t>grayscale images</a:t>
+            </a:r>
+            <a:endParaRPr sz="2300" dirty="0"/>
           </a:p>
           <a:p>
             <a:pPr marL="0" lvl="0" indent="0" algn="l" rtl="0">
@@ -6421,10 +6431,10 @@
               <a:buNone/>
             </a:pPr>
             <a:r>
-              <a:rPr lang="hu" sz="2300"/>
-              <a:t>60’000 image for training</a:t>
+              <a:rPr lang="hu" sz="2300" dirty="0"/>
+              <a:t>10 classes</a:t>
             </a:r>
-            <a:endParaRPr sz="2300"/>
+            <a:endParaRPr sz="2300" dirty="0"/>
           </a:p>
           <a:p>
             <a:pPr marL="0" lvl="0" indent="0" algn="l" rtl="0">
@@ -6440,10 +6450,10 @@
               <a:buNone/>
             </a:pPr>
             <a:r>
-              <a:rPr lang="hu" sz="2300"/>
-              <a:t>10’000 test image</a:t>
+              <a:rPr lang="hu" sz="2300" dirty="0"/>
+              <a:t>60’000 image for training</a:t>
             </a:r>
-            <a:endParaRPr sz="2300"/>
+            <a:endParaRPr sz="2300" dirty="0"/>
           </a:p>
           <a:p>
             <a:pPr marL="0" lvl="0" indent="0" algn="l" rtl="0">
@@ -6459,10 +6469,29 @@
               <a:buNone/>
             </a:pPr>
             <a:r>
-              <a:rPr lang="hu" sz="2300"/>
+              <a:rPr lang="hu" sz="2300" dirty="0"/>
+              <a:t>10’000 test image</a:t>
+            </a:r>
+            <a:endParaRPr sz="2300" dirty="0"/>
+          </a:p>
+          <a:p>
+            <a:pPr marL="0" lvl="0" indent="0" algn="l" rtl="0">
+              <a:lnSpc>
+                <a:spcPct val="150000"/>
+              </a:lnSpc>
+              <a:spcBef>
+                <a:spcPts val="0"/>
+              </a:spcBef>
+              <a:spcAft>
+                <a:spcPts val="0"/>
+              </a:spcAft>
+              <a:buNone/>
+            </a:pPr>
+            <a:r>
+              <a:rPr lang="hu" sz="2300" dirty="0"/>
               <a:t>At least 85% accuracy</a:t>
             </a:r>
-            <a:endParaRPr sz="2300"/>
+            <a:endParaRPr sz="2300" dirty="0"/>
           </a:p>
         </p:txBody>
       </p:sp>
@@ -6549,7 +6578,7 @@
         </p:nvSpPr>
         <p:spPr>
           <a:xfrm>
-            <a:off x="3443013" y="1739925"/>
+            <a:off x="3537606" y="1653214"/>
             <a:ext cx="2356200" cy="1692300"/>
           </a:xfrm>
           <a:prstGeom prst="rect">
@@ -6595,7 +6624,7 @@
         </p:nvSpPr>
         <p:spPr>
           <a:xfrm>
-            <a:off x="3927288" y="1958950"/>
+            <a:off x="4021881" y="1872239"/>
             <a:ext cx="358500" cy="338700"/>
           </a:xfrm>
           <a:prstGeom prst="rect">
@@ -6641,7 +6670,7 @@
         </p:nvSpPr>
         <p:spPr>
           <a:xfrm>
-            <a:off x="5021138" y="1864600"/>
+            <a:off x="5115731" y="1777889"/>
             <a:ext cx="358500" cy="338700"/>
           </a:xfrm>
           <a:prstGeom prst="rect">
@@ -6687,7 +6716,7 @@
         </p:nvSpPr>
         <p:spPr>
           <a:xfrm>
-            <a:off x="4013088" y="2297650"/>
+            <a:off x="4107681" y="2210939"/>
             <a:ext cx="358500" cy="338700"/>
           </a:xfrm>
           <a:prstGeom prst="rect">
@@ -6733,7 +6762,7 @@
         </p:nvSpPr>
         <p:spPr>
           <a:xfrm>
-            <a:off x="4530488" y="2489775"/>
+            <a:off x="4625081" y="2403064"/>
             <a:ext cx="358500" cy="338700"/>
           </a:xfrm>
           <a:prstGeom prst="rect">
@@ -6779,7 +6808,7 @@
         </p:nvSpPr>
         <p:spPr>
           <a:xfrm>
-            <a:off x="3873588" y="2701275"/>
+            <a:off x="3968181" y="2614564"/>
             <a:ext cx="358500" cy="338700"/>
           </a:xfrm>
           <a:prstGeom prst="rect">
@@ -6825,7 +6854,7 @@
         </p:nvSpPr>
         <p:spPr>
           <a:xfrm>
-            <a:off x="5081238" y="2416725"/>
+            <a:off x="5175831" y="2330014"/>
             <a:ext cx="358500" cy="338700"/>
           </a:xfrm>
           <a:prstGeom prst="rect">
@@ -6871,7 +6900,7 @@
         </p:nvSpPr>
         <p:spPr>
           <a:xfrm>
-            <a:off x="4841688" y="2873350"/>
+            <a:off x="4936281" y="2786639"/>
             <a:ext cx="459300" cy="338700"/>
           </a:xfrm>
           <a:prstGeom prst="rect">
@@ -6925,7 +6954,7 @@
         </p:blipFill>
         <p:spPr>
           <a:xfrm>
-            <a:off x="700738" y="1914627"/>
+            <a:off x="795331" y="1827916"/>
             <a:ext cx="1359125" cy="1342875"/>
           </a:xfrm>
           <a:prstGeom prst="rect">
@@ -6948,7 +6977,7 @@
         </p:nvCxnSpPr>
         <p:spPr>
           <a:xfrm>
-            <a:off x="2059862" y="2586064"/>
+            <a:off x="2154455" y="2499353"/>
             <a:ext cx="1383300" cy="0"/>
           </a:xfrm>
           <a:prstGeom prst="straightConnector1">
@@ -6976,7 +7005,7 @@
         </p:nvCxnSpPr>
         <p:spPr>
           <a:xfrm rot="10800000" flipH="1">
-            <a:off x="5878563" y="2092675"/>
+            <a:off x="5973156" y="2005964"/>
             <a:ext cx="666300" cy="900"/>
           </a:xfrm>
           <a:prstGeom prst="straightConnector1">
@@ -7002,7 +7031,7 @@
         </p:nvSpPr>
         <p:spPr>
           <a:xfrm>
-            <a:off x="6544863" y="1892575"/>
+            <a:off x="6639456" y="1805864"/>
             <a:ext cx="1275000" cy="400200"/>
           </a:xfrm>
           <a:prstGeom prst="rect">
@@ -7044,7 +7073,7 @@
         </p:nvSpPr>
         <p:spPr>
           <a:xfrm>
-            <a:off x="6881463" y="2930375"/>
+            <a:off x="6976056" y="2843664"/>
             <a:ext cx="601800" cy="400200"/>
           </a:xfrm>
           <a:prstGeom prst="rect">
@@ -7089,7 +7118,7 @@
         </p:nvCxnSpPr>
         <p:spPr>
           <a:xfrm>
-            <a:off x="7182363" y="2292775"/>
+            <a:off x="7276956" y="2206064"/>
             <a:ext cx="0" cy="637500"/>
           </a:xfrm>
           <a:prstGeom prst="straightConnector1">
@@ -7117,7 +7146,7 @@
         </p:nvCxnSpPr>
         <p:spPr>
           <a:xfrm rot="10800000">
-            <a:off x="5921763" y="3130475"/>
+            <a:off x="6016356" y="3043764"/>
             <a:ext cx="959700" cy="0"/>
           </a:xfrm>
           <a:prstGeom prst="straightConnector1">
@@ -7146,7 +7175,7 @@
         </p:nvCxnSpPr>
         <p:spPr>
           <a:xfrm rot="-5400000" flipH="1">
-            <a:off x="4244700" y="393102"/>
+            <a:off x="4339293" y="306391"/>
             <a:ext cx="73200" cy="5802000"/>
           </a:xfrm>
           <a:prstGeom prst="bentConnector3">
@@ -7176,7 +7205,7 @@
         </p:nvCxnSpPr>
         <p:spPr>
           <a:xfrm rot="10800000">
-            <a:off x="7182363" y="3330575"/>
+            <a:off x="7276956" y="3243864"/>
             <a:ext cx="0" cy="501900"/>
           </a:xfrm>
           <a:prstGeom prst="straightConnector1">
@@ -7202,7 +7231,7 @@
         </p:nvSpPr>
         <p:spPr>
           <a:xfrm>
-            <a:off x="795844" y="1495685"/>
+            <a:off x="890437" y="1408974"/>
             <a:ext cx="1168910" cy="307777"/>
           </a:xfrm>
           <a:prstGeom prst="rect">
@@ -7830,6 +7859,13 @@
   <p:clrMapOvr>
     <a:masterClrMapping/>
   </p:clrMapOvr>
+  <p:timing>
+    <p:tnLst>
+      <p:par>
+        <p:cTn id="1" dur="indefinite" restart="never" nodeType="tmRoot"/>
+      </p:par>
+    </p:tnLst>
+  </p:timing>
 </p:sld>
 </file>
 
@@ -8057,6 +8093,13 @@
   <p:clrMapOvr>
     <a:masterClrMapping/>
   </p:clrMapOvr>
+  <p:timing>
+    <p:tnLst>
+      <p:par>
+        <p:cTn id="1" dur="indefinite" restart="never" nodeType="tmRoot"/>
+      </p:par>
+    </p:tnLst>
+  </p:timing>
 </p:sld>
 </file>
 

</xml_diff>